<commit_message>
Revised neural network sketch
</commit_message>
<xml_diff>
--- a/gao_ai_proposal.pptx
+++ b/gao_ai_proposal.pptx
@@ -2828,7 +2828,7 @@
           <a:p>
             <a:fld id="{9C5B416F-12F7-8245-B7D4-D65FCD72D8E0}" type="datetimeFigureOut">
               <a:rPr lang="en-US" smtClean="0"/>
-              <a:t>7/17/23</a:t>
+              <a:t>7/20/23</a:t>
             </a:fld>
             <a:endParaRPr lang="en-US"/>
           </a:p>
@@ -2994,7 +2994,7 @@
           <a:p>
             <a:fld id="{24EA5F54-FBF3-1447-ACC7-2EF23A9C40CC}" type="datetimeFigureOut">
               <a:rPr lang="en-US" smtClean="0"/>
-              <a:t>7/17/23</a:t>
+              <a:t>7/20/23</a:t>
             </a:fld>
             <a:endParaRPr lang="en-US"/>
           </a:p>
@@ -6517,36 +6517,1953 @@
           </a:p>
         </p:txBody>
       </p:sp>
-      <p:pic>
-        <p:nvPicPr>
-          <p:cNvPr id="6" name="Picture 5">
+      <p:sp>
+        <p:nvSpPr>
+          <p:cNvPr id="5" name="Oval 4">
             <a:extLst>
               <a:ext uri="{FF2B5EF4-FFF2-40B4-BE49-F238E27FC236}">
-                <a16:creationId xmlns:a16="http://schemas.microsoft.com/office/drawing/2014/main" id="{A4CB770E-5FF7-8BA0-3053-E132921BC6DB}"/>
+                <a16:creationId xmlns:a16="http://schemas.microsoft.com/office/drawing/2014/main" id="{58E8FBCC-18D7-E675-B374-9E9B0A0BE234}"/>
               </a:ext>
             </a:extLst>
           </p:cNvPr>
-          <p:cNvPicPr>
-            <a:picLocks noChangeAspect="1"/>
-          </p:cNvPicPr>
+          <p:cNvSpPr/>
           <p:nvPr/>
-        </p:nvPicPr>
-        <p:blipFill>
-          <a:blip r:embed="rId3"/>
-          <a:stretch>
-            <a:fillRect/>
-          </a:stretch>
-        </p:blipFill>
+        </p:nvSpPr>
         <p:spPr>
           <a:xfrm>
-            <a:off x="1392938" y="789332"/>
-            <a:ext cx="6350000" cy="3886200"/>
+            <a:off x="2400305" y="1285800"/>
+            <a:ext cx="190748" cy="187869"/>
+          </a:xfrm>
+          <a:prstGeom prst="ellipse">
+            <a:avLst/>
+          </a:prstGeom>
+          <a:solidFill>
+            <a:schemeClr val="accent2"/>
+          </a:solidFill>
+          <a:ln>
+            <a:noFill/>
+          </a:ln>
+        </p:spPr>
+        <p:style>
+          <a:lnRef idx="1">
+            <a:schemeClr val="accent1"/>
+          </a:lnRef>
+          <a:fillRef idx="3">
+            <a:schemeClr val="accent1"/>
+          </a:fillRef>
+          <a:effectRef idx="2">
+            <a:schemeClr val="accent1"/>
+          </a:effectRef>
+          <a:fontRef idx="minor">
+            <a:schemeClr val="lt1"/>
+          </a:fontRef>
+        </p:style>
+        <p:txBody>
+          <a:bodyPr rtlCol="0" anchor="ctr"/>
+          <a:lstStyle/>
+          <a:p>
+            <a:pPr algn="ctr"/>
+            <a:endParaRPr lang="en-US" b="1" dirty="0">
+              <a:solidFill>
+                <a:srgbClr val="0E4F83"/>
+              </a:solidFill>
+            </a:endParaRPr>
+          </a:p>
+        </p:txBody>
+      </p:sp>
+      <p:sp>
+        <p:nvSpPr>
+          <p:cNvPr id="8" name="TextBox 7">
+            <a:extLst>
+              <a:ext uri="{FF2B5EF4-FFF2-40B4-BE49-F238E27FC236}">
+                <a16:creationId xmlns:a16="http://schemas.microsoft.com/office/drawing/2014/main" id="{663012F4-6886-0BC8-9B10-F45AF071C4F1}"/>
+              </a:ext>
+            </a:extLst>
+          </p:cNvPr>
+          <p:cNvSpPr txBox="1"/>
+          <p:nvPr/>
+        </p:nvSpPr>
+        <p:spPr>
+          <a:xfrm>
+            <a:off x="969658" y="813221"/>
+            <a:ext cx="1532075" cy="400110"/>
           </a:xfrm>
           <a:prstGeom prst="rect">
             <a:avLst/>
           </a:prstGeom>
+          <a:noFill/>
         </p:spPr>
-      </p:pic>
+        <p:txBody>
+          <a:bodyPr wrap="square" rtlCol="0">
+            <a:spAutoFit/>
+          </a:bodyPr>
+          <a:lstStyle/>
+          <a:p>
+            <a:pPr algn="ctr"/>
+            <a:r>
+              <a:rPr lang="en-US" sz="1000" dirty="0">
+                <a:latin typeface="Calibri" panose="020F0502020204030204" pitchFamily="34" charset="0"/>
+                <a:cs typeface="Calibri" panose="020F0502020204030204" pitchFamily="34" charset="0"/>
+              </a:rPr>
+              <a:t>Compliance Scores for Audit Procedures</a:t>
+            </a:r>
+          </a:p>
+        </p:txBody>
+      </p:sp>
+      <p:sp>
+        <p:nvSpPr>
+          <p:cNvPr id="9" name="TextBox 8">
+            <a:extLst>
+              <a:ext uri="{FF2B5EF4-FFF2-40B4-BE49-F238E27FC236}">
+                <a16:creationId xmlns:a16="http://schemas.microsoft.com/office/drawing/2014/main" id="{C6ECADDC-3B21-40DD-8874-9A06E833AF27}"/>
+              </a:ext>
+            </a:extLst>
+          </p:cNvPr>
+          <p:cNvSpPr txBox="1"/>
+          <p:nvPr/>
+        </p:nvSpPr>
+        <p:spPr>
+          <a:xfrm>
+            <a:off x="1290608" y="1162690"/>
+            <a:ext cx="1061250" cy="246221"/>
+          </a:xfrm>
+          <a:prstGeom prst="rect">
+            <a:avLst/>
+          </a:prstGeom>
+          <a:noFill/>
+        </p:spPr>
+        <p:txBody>
+          <a:bodyPr wrap="square" rtlCol="0">
+            <a:spAutoFit/>
+          </a:bodyPr>
+          <a:lstStyle/>
+          <a:p>
+            <a:pPr algn="r"/>
+            <a:r>
+              <a:rPr lang="en-US" sz="1000" dirty="0">
+                <a:solidFill>
+                  <a:srgbClr val="0070C0"/>
+                </a:solidFill>
+                <a:latin typeface="Calibri" panose="020F0502020204030204" pitchFamily="34" charset="0"/>
+                <a:cs typeface="Calibri" panose="020F0502020204030204" pitchFamily="34" charset="0"/>
+              </a:rPr>
+              <a:t>Governance</a:t>
+            </a:r>
+          </a:p>
+        </p:txBody>
+      </p:sp>
+      <p:sp>
+        <p:nvSpPr>
+          <p:cNvPr id="17" name="TextBox 16">
+            <a:extLst>
+              <a:ext uri="{FF2B5EF4-FFF2-40B4-BE49-F238E27FC236}">
+                <a16:creationId xmlns:a16="http://schemas.microsoft.com/office/drawing/2014/main" id="{EBE2BA8E-DCF6-9626-CBCB-61EB9969CDDA}"/>
+              </a:ext>
+            </a:extLst>
+          </p:cNvPr>
+          <p:cNvSpPr txBox="1"/>
+          <p:nvPr/>
+        </p:nvSpPr>
+        <p:spPr>
+          <a:xfrm>
+            <a:off x="1210287" y="1910997"/>
+            <a:ext cx="1109697" cy="230832"/>
+          </a:xfrm>
+          <a:prstGeom prst="rect">
+            <a:avLst/>
+          </a:prstGeom>
+          <a:noFill/>
+        </p:spPr>
+        <p:txBody>
+          <a:bodyPr wrap="square" rtlCol="0">
+            <a:spAutoFit/>
+          </a:bodyPr>
+          <a:lstStyle/>
+          <a:p>
+            <a:pPr algn="r"/>
+            <a:r>
+              <a:rPr lang="en-US" sz="900" b="1" dirty="0">
+                <a:latin typeface="Calibri" panose="020F0502020204030204" pitchFamily="34" charset="0"/>
+                <a:cs typeface="Calibri" panose="020F0502020204030204" pitchFamily="34" charset="0"/>
+              </a:rPr>
+              <a:t>…</a:t>
+            </a:r>
+          </a:p>
+        </p:txBody>
+      </p:sp>
+      <p:sp>
+        <p:nvSpPr>
+          <p:cNvPr id="18" name="TextBox 17">
+            <a:extLst>
+              <a:ext uri="{FF2B5EF4-FFF2-40B4-BE49-F238E27FC236}">
+                <a16:creationId xmlns:a16="http://schemas.microsoft.com/office/drawing/2014/main" id="{2EF4D0B7-7212-B2FD-1F35-C77A901A2B48}"/>
+              </a:ext>
+            </a:extLst>
+          </p:cNvPr>
+          <p:cNvSpPr txBox="1"/>
+          <p:nvPr/>
+        </p:nvSpPr>
+        <p:spPr>
+          <a:xfrm>
+            <a:off x="1239623" y="2085648"/>
+            <a:ext cx="1109697" cy="215444"/>
+          </a:xfrm>
+          <a:prstGeom prst="rect">
+            <a:avLst/>
+          </a:prstGeom>
+          <a:noFill/>
+        </p:spPr>
+        <p:txBody>
+          <a:bodyPr wrap="square" rtlCol="0">
+            <a:spAutoFit/>
+          </a:bodyPr>
+          <a:lstStyle/>
+          <a:p>
+            <a:pPr algn="ctr"/>
+            <a:r>
+              <a:rPr lang="en-US" sz="800" dirty="0">
+                <a:latin typeface="Calibri" panose="020F0502020204030204" pitchFamily="34" charset="0"/>
+                <a:cs typeface="Calibri" panose="020F0502020204030204" pitchFamily="34" charset="0"/>
+              </a:rPr>
+              <a:t>Section 1.9 = Score 75</a:t>
+            </a:r>
+          </a:p>
+        </p:txBody>
+      </p:sp>
+      <p:sp>
+        <p:nvSpPr>
+          <p:cNvPr id="19" name="TextBox 18">
+            <a:extLst>
+              <a:ext uri="{FF2B5EF4-FFF2-40B4-BE49-F238E27FC236}">
+                <a16:creationId xmlns:a16="http://schemas.microsoft.com/office/drawing/2014/main" id="{ECC037D5-F3C9-92E5-9ADE-CD271AE3D136}"/>
+              </a:ext>
+            </a:extLst>
+          </p:cNvPr>
+          <p:cNvSpPr txBox="1"/>
+          <p:nvPr/>
+        </p:nvSpPr>
+        <p:spPr>
+          <a:xfrm>
+            <a:off x="1288070" y="2268238"/>
+            <a:ext cx="1061250" cy="246221"/>
+          </a:xfrm>
+          <a:prstGeom prst="rect">
+            <a:avLst/>
+          </a:prstGeom>
+          <a:noFill/>
+        </p:spPr>
+        <p:txBody>
+          <a:bodyPr wrap="square" rtlCol="0">
+            <a:spAutoFit/>
+          </a:bodyPr>
+          <a:lstStyle/>
+          <a:p>
+            <a:pPr algn="r"/>
+            <a:r>
+              <a:rPr lang="en-US" sz="1000" dirty="0">
+                <a:solidFill>
+                  <a:srgbClr val="0070C0"/>
+                </a:solidFill>
+                <a:latin typeface="Calibri" panose="020F0502020204030204" pitchFamily="34" charset="0"/>
+                <a:cs typeface="Calibri" panose="020F0502020204030204" pitchFamily="34" charset="0"/>
+              </a:rPr>
+              <a:t>Data</a:t>
+            </a:r>
+          </a:p>
+        </p:txBody>
+      </p:sp>
+      <p:sp>
+        <p:nvSpPr>
+          <p:cNvPr id="20" name="TextBox 19">
+            <a:extLst>
+              <a:ext uri="{FF2B5EF4-FFF2-40B4-BE49-F238E27FC236}">
+                <a16:creationId xmlns:a16="http://schemas.microsoft.com/office/drawing/2014/main" id="{C03F99E3-422B-B7B8-D6A0-F8C16B8797FC}"/>
+              </a:ext>
+            </a:extLst>
+          </p:cNvPr>
+          <p:cNvSpPr txBox="1"/>
+          <p:nvPr/>
+        </p:nvSpPr>
+        <p:spPr>
+          <a:xfrm>
+            <a:off x="1236102" y="1768486"/>
+            <a:ext cx="1109697" cy="215444"/>
+          </a:xfrm>
+          <a:prstGeom prst="rect">
+            <a:avLst/>
+          </a:prstGeom>
+          <a:noFill/>
+        </p:spPr>
+        <p:txBody>
+          <a:bodyPr wrap="square" rtlCol="0">
+            <a:spAutoFit/>
+          </a:bodyPr>
+          <a:lstStyle/>
+          <a:p>
+            <a:pPr algn="ctr"/>
+            <a:r>
+              <a:rPr lang="en-US" sz="800" dirty="0">
+                <a:latin typeface="Calibri" panose="020F0502020204030204" pitchFamily="34" charset="0"/>
+                <a:cs typeface="Calibri" panose="020F0502020204030204" pitchFamily="34" charset="0"/>
+              </a:rPr>
+              <a:t>Section 1.3 = Score 99</a:t>
+            </a:r>
+          </a:p>
+        </p:txBody>
+      </p:sp>
+      <p:sp>
+        <p:nvSpPr>
+          <p:cNvPr id="21" name="TextBox 20">
+            <a:extLst>
+              <a:ext uri="{FF2B5EF4-FFF2-40B4-BE49-F238E27FC236}">
+                <a16:creationId xmlns:a16="http://schemas.microsoft.com/office/drawing/2014/main" id="{9252995E-3E6A-3851-C43D-8A3FD7C6538D}"/>
+              </a:ext>
+            </a:extLst>
+          </p:cNvPr>
+          <p:cNvSpPr txBox="1"/>
+          <p:nvPr/>
+        </p:nvSpPr>
+        <p:spPr>
+          <a:xfrm>
+            <a:off x="1242161" y="1580119"/>
+            <a:ext cx="1109697" cy="215444"/>
+          </a:xfrm>
+          <a:prstGeom prst="rect">
+            <a:avLst/>
+          </a:prstGeom>
+          <a:noFill/>
+        </p:spPr>
+        <p:txBody>
+          <a:bodyPr wrap="square" rtlCol="0">
+            <a:spAutoFit/>
+          </a:bodyPr>
+          <a:lstStyle/>
+          <a:p>
+            <a:pPr algn="ctr"/>
+            <a:r>
+              <a:rPr lang="en-US" sz="800" dirty="0">
+                <a:latin typeface="Calibri" panose="020F0502020204030204" pitchFamily="34" charset="0"/>
+                <a:cs typeface="Calibri" panose="020F0502020204030204" pitchFamily="34" charset="0"/>
+              </a:rPr>
+              <a:t>Section 1.2 = Score 40</a:t>
+            </a:r>
+          </a:p>
+        </p:txBody>
+      </p:sp>
+      <p:sp>
+        <p:nvSpPr>
+          <p:cNvPr id="22" name="TextBox 21">
+            <a:extLst>
+              <a:ext uri="{FF2B5EF4-FFF2-40B4-BE49-F238E27FC236}">
+                <a16:creationId xmlns:a16="http://schemas.microsoft.com/office/drawing/2014/main" id="{84130B35-7014-CDF1-B870-3D3E6077804F}"/>
+              </a:ext>
+            </a:extLst>
+          </p:cNvPr>
+          <p:cNvSpPr txBox="1"/>
+          <p:nvPr/>
+        </p:nvSpPr>
+        <p:spPr>
+          <a:xfrm>
+            <a:off x="1242161" y="1373489"/>
+            <a:ext cx="1109697" cy="215444"/>
+          </a:xfrm>
+          <a:prstGeom prst="rect">
+            <a:avLst/>
+          </a:prstGeom>
+          <a:noFill/>
+        </p:spPr>
+        <p:txBody>
+          <a:bodyPr wrap="square" rtlCol="0">
+            <a:spAutoFit/>
+          </a:bodyPr>
+          <a:lstStyle/>
+          <a:p>
+            <a:pPr algn="ctr"/>
+            <a:r>
+              <a:rPr lang="en-US" sz="800" dirty="0">
+                <a:latin typeface="Calibri" panose="020F0502020204030204" pitchFamily="34" charset="0"/>
+                <a:cs typeface="Calibri" panose="020F0502020204030204" pitchFamily="34" charset="0"/>
+              </a:rPr>
+              <a:t>Section 1.1 = Score 20</a:t>
+            </a:r>
+          </a:p>
+        </p:txBody>
+      </p:sp>
+      <p:sp>
+        <p:nvSpPr>
+          <p:cNvPr id="23" name="TextBox 22">
+            <a:extLst>
+              <a:ext uri="{FF2B5EF4-FFF2-40B4-BE49-F238E27FC236}">
+                <a16:creationId xmlns:a16="http://schemas.microsoft.com/office/drawing/2014/main" id="{3768496B-57CE-1913-6A83-0F51623C9421}"/>
+              </a:ext>
+            </a:extLst>
+          </p:cNvPr>
+          <p:cNvSpPr txBox="1"/>
+          <p:nvPr/>
+        </p:nvSpPr>
+        <p:spPr>
+          <a:xfrm>
+            <a:off x="1239623" y="2460072"/>
+            <a:ext cx="1109697" cy="215444"/>
+          </a:xfrm>
+          <a:prstGeom prst="rect">
+            <a:avLst/>
+          </a:prstGeom>
+          <a:noFill/>
+        </p:spPr>
+        <p:txBody>
+          <a:bodyPr wrap="square" rtlCol="0">
+            <a:spAutoFit/>
+          </a:bodyPr>
+          <a:lstStyle/>
+          <a:p>
+            <a:pPr algn="ctr"/>
+            <a:r>
+              <a:rPr lang="en-US" sz="800" dirty="0">
+                <a:latin typeface="Calibri" panose="020F0502020204030204" pitchFamily="34" charset="0"/>
+                <a:cs typeface="Calibri" panose="020F0502020204030204" pitchFamily="34" charset="0"/>
+              </a:rPr>
+              <a:t>Section 2.1 = Score 27</a:t>
+            </a:r>
+          </a:p>
+        </p:txBody>
+      </p:sp>
+      <p:sp>
+        <p:nvSpPr>
+          <p:cNvPr id="24" name="TextBox 23">
+            <a:extLst>
+              <a:ext uri="{FF2B5EF4-FFF2-40B4-BE49-F238E27FC236}">
+                <a16:creationId xmlns:a16="http://schemas.microsoft.com/office/drawing/2014/main" id="{522FA504-F497-3F0B-1DCD-ADCAEA93A7F3}"/>
+              </a:ext>
+            </a:extLst>
+          </p:cNvPr>
+          <p:cNvSpPr txBox="1"/>
+          <p:nvPr/>
+        </p:nvSpPr>
+        <p:spPr>
+          <a:xfrm>
+            <a:off x="1216994" y="2612785"/>
+            <a:ext cx="1109697" cy="230832"/>
+          </a:xfrm>
+          <a:prstGeom prst="rect">
+            <a:avLst/>
+          </a:prstGeom>
+          <a:noFill/>
+        </p:spPr>
+        <p:txBody>
+          <a:bodyPr wrap="square" rtlCol="0">
+            <a:spAutoFit/>
+          </a:bodyPr>
+          <a:lstStyle/>
+          <a:p>
+            <a:pPr algn="r"/>
+            <a:r>
+              <a:rPr lang="en-US" sz="900" b="1" dirty="0">
+                <a:latin typeface="Calibri" panose="020F0502020204030204" pitchFamily="34" charset="0"/>
+                <a:cs typeface="Calibri" panose="020F0502020204030204" pitchFamily="34" charset="0"/>
+              </a:rPr>
+              <a:t>…</a:t>
+            </a:r>
+          </a:p>
+        </p:txBody>
+      </p:sp>
+      <p:sp>
+        <p:nvSpPr>
+          <p:cNvPr id="25" name="TextBox 24">
+            <a:extLst>
+              <a:ext uri="{FF2B5EF4-FFF2-40B4-BE49-F238E27FC236}">
+                <a16:creationId xmlns:a16="http://schemas.microsoft.com/office/drawing/2014/main" id="{5213CD26-283E-02FE-F516-18773DEFD8D0}"/>
+              </a:ext>
+            </a:extLst>
+          </p:cNvPr>
+          <p:cNvSpPr txBox="1"/>
+          <p:nvPr/>
+        </p:nvSpPr>
+        <p:spPr>
+          <a:xfrm>
+            <a:off x="1239622" y="2787060"/>
+            <a:ext cx="1109697" cy="215444"/>
+          </a:xfrm>
+          <a:prstGeom prst="rect">
+            <a:avLst/>
+          </a:prstGeom>
+          <a:noFill/>
+        </p:spPr>
+        <p:txBody>
+          <a:bodyPr wrap="square" rtlCol="0">
+            <a:spAutoFit/>
+          </a:bodyPr>
+          <a:lstStyle/>
+          <a:p>
+            <a:pPr algn="ctr"/>
+            <a:r>
+              <a:rPr lang="en-US" sz="800" dirty="0">
+                <a:latin typeface="Calibri" panose="020F0502020204030204" pitchFamily="34" charset="0"/>
+                <a:cs typeface="Calibri" panose="020F0502020204030204" pitchFamily="34" charset="0"/>
+              </a:rPr>
+              <a:t>Section 2.8 = Score 89</a:t>
+            </a:r>
+          </a:p>
+        </p:txBody>
+      </p:sp>
+      <p:sp>
+        <p:nvSpPr>
+          <p:cNvPr id="26" name="TextBox 25">
+            <a:extLst>
+              <a:ext uri="{FF2B5EF4-FFF2-40B4-BE49-F238E27FC236}">
+                <a16:creationId xmlns:a16="http://schemas.microsoft.com/office/drawing/2014/main" id="{16B79E5C-CABE-AE6E-A667-4F6D6A01FA1C}"/>
+              </a:ext>
+            </a:extLst>
+          </p:cNvPr>
+          <p:cNvSpPr txBox="1"/>
+          <p:nvPr/>
+        </p:nvSpPr>
+        <p:spPr>
+          <a:xfrm>
+            <a:off x="1265010" y="2952811"/>
+            <a:ext cx="1061250" cy="246221"/>
+          </a:xfrm>
+          <a:prstGeom prst="rect">
+            <a:avLst/>
+          </a:prstGeom>
+          <a:noFill/>
+        </p:spPr>
+        <p:txBody>
+          <a:bodyPr wrap="square" rtlCol="0">
+            <a:spAutoFit/>
+          </a:bodyPr>
+          <a:lstStyle/>
+          <a:p>
+            <a:pPr algn="r"/>
+            <a:r>
+              <a:rPr lang="en-US" sz="1000" dirty="0">
+                <a:solidFill>
+                  <a:srgbClr val="0070C0"/>
+                </a:solidFill>
+                <a:latin typeface="Calibri" panose="020F0502020204030204" pitchFamily="34" charset="0"/>
+                <a:cs typeface="Calibri" panose="020F0502020204030204" pitchFamily="34" charset="0"/>
+              </a:rPr>
+              <a:t>Performance</a:t>
+            </a:r>
+          </a:p>
+        </p:txBody>
+      </p:sp>
+      <p:sp>
+        <p:nvSpPr>
+          <p:cNvPr id="27" name="TextBox 26">
+            <a:extLst>
+              <a:ext uri="{FF2B5EF4-FFF2-40B4-BE49-F238E27FC236}">
+                <a16:creationId xmlns:a16="http://schemas.microsoft.com/office/drawing/2014/main" id="{7EF0C524-3C98-1EDF-2F77-0C2304C25344}"/>
+              </a:ext>
+            </a:extLst>
+          </p:cNvPr>
+          <p:cNvSpPr txBox="1"/>
+          <p:nvPr/>
+        </p:nvSpPr>
+        <p:spPr>
+          <a:xfrm>
+            <a:off x="1234509" y="3131643"/>
+            <a:ext cx="1109697" cy="215444"/>
+          </a:xfrm>
+          <a:prstGeom prst="rect">
+            <a:avLst/>
+          </a:prstGeom>
+          <a:noFill/>
+        </p:spPr>
+        <p:txBody>
+          <a:bodyPr wrap="square" rtlCol="0">
+            <a:spAutoFit/>
+          </a:bodyPr>
+          <a:lstStyle/>
+          <a:p>
+            <a:pPr algn="ctr"/>
+            <a:r>
+              <a:rPr lang="en-US" sz="800" dirty="0">
+                <a:latin typeface="Calibri" panose="020F0502020204030204" pitchFamily="34" charset="0"/>
+                <a:cs typeface="Calibri" panose="020F0502020204030204" pitchFamily="34" charset="0"/>
+              </a:rPr>
+              <a:t>Section 3.1 = Score 72</a:t>
+            </a:r>
+          </a:p>
+        </p:txBody>
+      </p:sp>
+      <p:sp>
+        <p:nvSpPr>
+          <p:cNvPr id="28" name="TextBox 27">
+            <a:extLst>
+              <a:ext uri="{FF2B5EF4-FFF2-40B4-BE49-F238E27FC236}">
+                <a16:creationId xmlns:a16="http://schemas.microsoft.com/office/drawing/2014/main" id="{5952D634-1154-458C-10E4-E35560341C78}"/>
+              </a:ext>
+            </a:extLst>
+          </p:cNvPr>
+          <p:cNvSpPr txBox="1"/>
+          <p:nvPr/>
+        </p:nvSpPr>
+        <p:spPr>
+          <a:xfrm>
+            <a:off x="1203237" y="3274697"/>
+            <a:ext cx="1109697" cy="230832"/>
+          </a:xfrm>
+          <a:prstGeom prst="rect">
+            <a:avLst/>
+          </a:prstGeom>
+          <a:noFill/>
+        </p:spPr>
+        <p:txBody>
+          <a:bodyPr wrap="square" rtlCol="0">
+            <a:spAutoFit/>
+          </a:bodyPr>
+          <a:lstStyle/>
+          <a:p>
+            <a:pPr algn="r"/>
+            <a:r>
+              <a:rPr lang="en-US" sz="900" b="1" dirty="0">
+                <a:latin typeface="Calibri" panose="020F0502020204030204" pitchFamily="34" charset="0"/>
+                <a:cs typeface="Calibri" panose="020F0502020204030204" pitchFamily="34" charset="0"/>
+              </a:rPr>
+              <a:t>…</a:t>
+            </a:r>
+          </a:p>
+        </p:txBody>
+      </p:sp>
+      <p:sp>
+        <p:nvSpPr>
+          <p:cNvPr id="29" name="TextBox 28">
+            <a:extLst>
+              <a:ext uri="{FF2B5EF4-FFF2-40B4-BE49-F238E27FC236}">
+                <a16:creationId xmlns:a16="http://schemas.microsoft.com/office/drawing/2014/main" id="{DA4652A5-4DE5-9B2D-B97A-A91B8322AC01}"/>
+              </a:ext>
+            </a:extLst>
+          </p:cNvPr>
+          <p:cNvSpPr txBox="1"/>
+          <p:nvPr/>
+        </p:nvSpPr>
+        <p:spPr>
+          <a:xfrm>
+            <a:off x="1242161" y="3450502"/>
+            <a:ext cx="1109697" cy="215444"/>
+          </a:xfrm>
+          <a:prstGeom prst="rect">
+            <a:avLst/>
+          </a:prstGeom>
+          <a:noFill/>
+        </p:spPr>
+        <p:txBody>
+          <a:bodyPr wrap="square" rtlCol="0">
+            <a:spAutoFit/>
+          </a:bodyPr>
+          <a:lstStyle/>
+          <a:p>
+            <a:pPr algn="ctr"/>
+            <a:r>
+              <a:rPr lang="en-US" sz="800" dirty="0">
+                <a:latin typeface="Calibri" panose="020F0502020204030204" pitchFamily="34" charset="0"/>
+                <a:cs typeface="Calibri" panose="020F0502020204030204" pitchFamily="34" charset="0"/>
+              </a:rPr>
+              <a:t>Section 3.9 = Score 55</a:t>
+            </a:r>
+          </a:p>
+        </p:txBody>
+      </p:sp>
+      <p:sp>
+        <p:nvSpPr>
+          <p:cNvPr id="30" name="TextBox 29">
+            <a:extLst>
+              <a:ext uri="{FF2B5EF4-FFF2-40B4-BE49-F238E27FC236}">
+                <a16:creationId xmlns:a16="http://schemas.microsoft.com/office/drawing/2014/main" id="{21F5F451-E78E-81F3-A671-B5B233FF9E01}"/>
+              </a:ext>
+            </a:extLst>
+          </p:cNvPr>
+          <p:cNvSpPr txBox="1"/>
+          <p:nvPr/>
+        </p:nvSpPr>
+        <p:spPr>
+          <a:xfrm>
+            <a:off x="1282956" y="3605859"/>
+            <a:ext cx="1061250" cy="246221"/>
+          </a:xfrm>
+          <a:prstGeom prst="rect">
+            <a:avLst/>
+          </a:prstGeom>
+          <a:noFill/>
+        </p:spPr>
+        <p:txBody>
+          <a:bodyPr wrap="square" rtlCol="0">
+            <a:spAutoFit/>
+          </a:bodyPr>
+          <a:lstStyle/>
+          <a:p>
+            <a:pPr algn="r"/>
+            <a:r>
+              <a:rPr lang="en-US" sz="1000" dirty="0">
+                <a:solidFill>
+                  <a:srgbClr val="0070C0"/>
+                </a:solidFill>
+                <a:latin typeface="Calibri" panose="020F0502020204030204" pitchFamily="34" charset="0"/>
+                <a:cs typeface="Calibri" panose="020F0502020204030204" pitchFamily="34" charset="0"/>
+              </a:rPr>
+              <a:t>Monitoring</a:t>
+            </a:r>
+          </a:p>
+        </p:txBody>
+      </p:sp>
+      <p:sp>
+        <p:nvSpPr>
+          <p:cNvPr id="31" name="TextBox 30">
+            <a:extLst>
+              <a:ext uri="{FF2B5EF4-FFF2-40B4-BE49-F238E27FC236}">
+                <a16:creationId xmlns:a16="http://schemas.microsoft.com/office/drawing/2014/main" id="{C1F00A9C-FE9D-2C2D-5E8E-6AA08D1FB9DE}"/>
+              </a:ext>
+            </a:extLst>
+          </p:cNvPr>
+          <p:cNvSpPr txBox="1"/>
+          <p:nvPr/>
+        </p:nvSpPr>
+        <p:spPr>
+          <a:xfrm>
+            <a:off x="1234509" y="3798441"/>
+            <a:ext cx="1109697" cy="215444"/>
+          </a:xfrm>
+          <a:prstGeom prst="rect">
+            <a:avLst/>
+          </a:prstGeom>
+          <a:noFill/>
+        </p:spPr>
+        <p:txBody>
+          <a:bodyPr wrap="square" rtlCol="0">
+            <a:spAutoFit/>
+          </a:bodyPr>
+          <a:lstStyle/>
+          <a:p>
+            <a:pPr algn="ctr"/>
+            <a:r>
+              <a:rPr lang="en-US" sz="800" dirty="0">
+                <a:latin typeface="Calibri" panose="020F0502020204030204" pitchFamily="34" charset="0"/>
+                <a:cs typeface="Calibri" panose="020F0502020204030204" pitchFamily="34" charset="0"/>
+              </a:rPr>
+              <a:t>Section 4.1 = Score 49</a:t>
+            </a:r>
+          </a:p>
+        </p:txBody>
+      </p:sp>
+      <p:sp>
+        <p:nvSpPr>
+          <p:cNvPr id="32" name="TextBox 31">
+            <a:extLst>
+              <a:ext uri="{FF2B5EF4-FFF2-40B4-BE49-F238E27FC236}">
+                <a16:creationId xmlns:a16="http://schemas.microsoft.com/office/drawing/2014/main" id="{785E627E-02AF-7684-DAE9-42AA5BC2A301}"/>
+              </a:ext>
+            </a:extLst>
+          </p:cNvPr>
+          <p:cNvSpPr txBox="1"/>
+          <p:nvPr/>
+        </p:nvSpPr>
+        <p:spPr>
+          <a:xfrm>
+            <a:off x="1203237" y="3932912"/>
+            <a:ext cx="1109697" cy="230832"/>
+          </a:xfrm>
+          <a:prstGeom prst="rect">
+            <a:avLst/>
+          </a:prstGeom>
+          <a:noFill/>
+        </p:spPr>
+        <p:txBody>
+          <a:bodyPr wrap="square" rtlCol="0">
+            <a:spAutoFit/>
+          </a:bodyPr>
+          <a:lstStyle/>
+          <a:p>
+            <a:pPr algn="r"/>
+            <a:r>
+              <a:rPr lang="en-US" sz="900" b="1" dirty="0">
+                <a:latin typeface="Calibri" panose="020F0502020204030204" pitchFamily="34" charset="0"/>
+                <a:cs typeface="Calibri" panose="020F0502020204030204" pitchFamily="34" charset="0"/>
+              </a:rPr>
+              <a:t>…</a:t>
+            </a:r>
+          </a:p>
+        </p:txBody>
+      </p:sp>
+      <p:sp>
+        <p:nvSpPr>
+          <p:cNvPr id="33" name="TextBox 32">
+            <a:extLst>
+              <a:ext uri="{FF2B5EF4-FFF2-40B4-BE49-F238E27FC236}">
+                <a16:creationId xmlns:a16="http://schemas.microsoft.com/office/drawing/2014/main" id="{8E44E8AF-EE72-4D32-5279-F0E4071A25D5}"/>
+              </a:ext>
+            </a:extLst>
+          </p:cNvPr>
+          <p:cNvSpPr txBox="1"/>
+          <p:nvPr/>
+        </p:nvSpPr>
+        <p:spPr>
+          <a:xfrm>
+            <a:off x="1242161" y="4097031"/>
+            <a:ext cx="1109697" cy="215444"/>
+          </a:xfrm>
+          <a:prstGeom prst="rect">
+            <a:avLst/>
+          </a:prstGeom>
+          <a:noFill/>
+        </p:spPr>
+        <p:txBody>
+          <a:bodyPr wrap="square" rtlCol="0">
+            <a:spAutoFit/>
+          </a:bodyPr>
+          <a:lstStyle/>
+          <a:p>
+            <a:pPr algn="ctr"/>
+            <a:r>
+              <a:rPr lang="en-US" sz="800" dirty="0">
+                <a:latin typeface="Calibri" panose="020F0502020204030204" pitchFamily="34" charset="0"/>
+                <a:cs typeface="Calibri" panose="020F0502020204030204" pitchFamily="34" charset="0"/>
+              </a:rPr>
+              <a:t>Section 4.5 = Score 92</a:t>
+            </a:r>
+          </a:p>
+        </p:txBody>
+      </p:sp>
+      <p:sp>
+        <p:nvSpPr>
+          <p:cNvPr id="34" name="Oval 33">
+            <a:extLst>
+              <a:ext uri="{FF2B5EF4-FFF2-40B4-BE49-F238E27FC236}">
+                <a16:creationId xmlns:a16="http://schemas.microsoft.com/office/drawing/2014/main" id="{99897446-8A93-68F7-AEBA-041BD8C5716E}"/>
+              </a:ext>
+            </a:extLst>
+          </p:cNvPr>
+          <p:cNvSpPr/>
+          <p:nvPr/>
+        </p:nvSpPr>
+        <p:spPr>
+          <a:xfrm>
+            <a:off x="3648354" y="1637696"/>
+            <a:ext cx="190748" cy="187869"/>
+          </a:xfrm>
+          <a:prstGeom prst="ellipse">
+            <a:avLst/>
+          </a:prstGeom>
+          <a:solidFill>
+            <a:schemeClr val="accent2"/>
+          </a:solidFill>
+          <a:ln>
+            <a:noFill/>
+          </a:ln>
+        </p:spPr>
+        <p:style>
+          <a:lnRef idx="1">
+            <a:schemeClr val="accent1"/>
+          </a:lnRef>
+          <a:fillRef idx="3">
+            <a:schemeClr val="accent1"/>
+          </a:fillRef>
+          <a:effectRef idx="2">
+            <a:schemeClr val="accent1"/>
+          </a:effectRef>
+          <a:fontRef idx="minor">
+            <a:schemeClr val="lt1"/>
+          </a:fontRef>
+        </p:style>
+        <p:txBody>
+          <a:bodyPr rtlCol="0" anchor="ctr"/>
+          <a:lstStyle/>
+          <a:p>
+            <a:pPr algn="ctr"/>
+            <a:endParaRPr lang="en-US" b="1" dirty="0">
+              <a:solidFill>
+                <a:srgbClr val="0E4F83"/>
+              </a:solidFill>
+            </a:endParaRPr>
+          </a:p>
+        </p:txBody>
+      </p:sp>
+      <p:sp>
+        <p:nvSpPr>
+          <p:cNvPr id="35" name="Oval 34">
+            <a:extLst>
+              <a:ext uri="{FF2B5EF4-FFF2-40B4-BE49-F238E27FC236}">
+                <a16:creationId xmlns:a16="http://schemas.microsoft.com/office/drawing/2014/main" id="{440F073C-37C1-2740-9DC5-4CB2E7FD430D}"/>
+              </a:ext>
+            </a:extLst>
+          </p:cNvPr>
+          <p:cNvSpPr/>
+          <p:nvPr/>
+        </p:nvSpPr>
+        <p:spPr>
+          <a:xfrm>
+            <a:off x="2400305" y="1637696"/>
+            <a:ext cx="190748" cy="187869"/>
+          </a:xfrm>
+          <a:prstGeom prst="ellipse">
+            <a:avLst/>
+          </a:prstGeom>
+          <a:solidFill>
+            <a:schemeClr val="accent2"/>
+          </a:solidFill>
+          <a:ln>
+            <a:noFill/>
+          </a:ln>
+        </p:spPr>
+        <p:style>
+          <a:lnRef idx="1">
+            <a:schemeClr val="accent1"/>
+          </a:lnRef>
+          <a:fillRef idx="3">
+            <a:schemeClr val="accent1"/>
+          </a:fillRef>
+          <a:effectRef idx="2">
+            <a:schemeClr val="accent1"/>
+          </a:effectRef>
+          <a:fontRef idx="minor">
+            <a:schemeClr val="lt1"/>
+          </a:fontRef>
+        </p:style>
+        <p:txBody>
+          <a:bodyPr rtlCol="0" anchor="ctr"/>
+          <a:lstStyle/>
+          <a:p>
+            <a:pPr algn="ctr"/>
+            <a:endParaRPr lang="en-US" b="1" dirty="0">
+              <a:solidFill>
+                <a:srgbClr val="0E4F83"/>
+              </a:solidFill>
+            </a:endParaRPr>
+          </a:p>
+        </p:txBody>
+      </p:sp>
+      <p:sp>
+        <p:nvSpPr>
+          <p:cNvPr id="36" name="Oval 35">
+            <a:extLst>
+              <a:ext uri="{FF2B5EF4-FFF2-40B4-BE49-F238E27FC236}">
+                <a16:creationId xmlns:a16="http://schemas.microsoft.com/office/drawing/2014/main" id="{C94D57C6-3367-AA9F-D6F8-0B84DC671639}"/>
+              </a:ext>
+            </a:extLst>
+          </p:cNvPr>
+          <p:cNvSpPr/>
+          <p:nvPr/>
+        </p:nvSpPr>
+        <p:spPr>
+          <a:xfrm>
+            <a:off x="2400305" y="1991713"/>
+            <a:ext cx="190748" cy="187869"/>
+          </a:xfrm>
+          <a:prstGeom prst="ellipse">
+            <a:avLst/>
+          </a:prstGeom>
+          <a:solidFill>
+            <a:schemeClr val="accent2"/>
+          </a:solidFill>
+          <a:ln>
+            <a:noFill/>
+          </a:ln>
+        </p:spPr>
+        <p:style>
+          <a:lnRef idx="1">
+            <a:schemeClr val="accent1"/>
+          </a:lnRef>
+          <a:fillRef idx="3">
+            <a:schemeClr val="accent1"/>
+          </a:fillRef>
+          <a:effectRef idx="2">
+            <a:schemeClr val="accent1"/>
+          </a:effectRef>
+          <a:fontRef idx="minor">
+            <a:schemeClr val="lt1"/>
+          </a:fontRef>
+        </p:style>
+        <p:txBody>
+          <a:bodyPr rtlCol="0" anchor="ctr"/>
+          <a:lstStyle/>
+          <a:p>
+            <a:pPr algn="ctr"/>
+            <a:endParaRPr lang="en-US" b="1" dirty="0">
+              <a:solidFill>
+                <a:srgbClr val="0E4F83"/>
+              </a:solidFill>
+            </a:endParaRPr>
+          </a:p>
+        </p:txBody>
+      </p:sp>
+      <p:sp>
+        <p:nvSpPr>
+          <p:cNvPr id="37" name="Oval 36">
+            <a:extLst>
+              <a:ext uri="{FF2B5EF4-FFF2-40B4-BE49-F238E27FC236}">
+                <a16:creationId xmlns:a16="http://schemas.microsoft.com/office/drawing/2014/main" id="{DE63694B-2C74-98DD-C924-8017D2C4C4D9}"/>
+              </a:ext>
+            </a:extLst>
+          </p:cNvPr>
+          <p:cNvSpPr/>
+          <p:nvPr/>
+        </p:nvSpPr>
+        <p:spPr>
+          <a:xfrm>
+            <a:off x="2400305" y="2436521"/>
+            <a:ext cx="190748" cy="187869"/>
+          </a:xfrm>
+          <a:prstGeom prst="ellipse">
+            <a:avLst/>
+          </a:prstGeom>
+          <a:solidFill>
+            <a:schemeClr val="accent2"/>
+          </a:solidFill>
+          <a:ln>
+            <a:noFill/>
+          </a:ln>
+        </p:spPr>
+        <p:style>
+          <a:lnRef idx="1">
+            <a:schemeClr val="accent1"/>
+          </a:lnRef>
+          <a:fillRef idx="3">
+            <a:schemeClr val="accent1"/>
+          </a:fillRef>
+          <a:effectRef idx="2">
+            <a:schemeClr val="accent1"/>
+          </a:effectRef>
+          <a:fontRef idx="minor">
+            <a:schemeClr val="lt1"/>
+          </a:fontRef>
+        </p:style>
+        <p:txBody>
+          <a:bodyPr rtlCol="0" anchor="ctr"/>
+          <a:lstStyle/>
+          <a:p>
+            <a:pPr algn="ctr"/>
+            <a:endParaRPr lang="en-US" b="1" dirty="0">
+              <a:solidFill>
+                <a:srgbClr val="0E4F83"/>
+              </a:solidFill>
+            </a:endParaRPr>
+          </a:p>
+        </p:txBody>
+      </p:sp>
+      <p:sp>
+        <p:nvSpPr>
+          <p:cNvPr id="38" name="Oval 37">
+            <a:extLst>
+              <a:ext uri="{FF2B5EF4-FFF2-40B4-BE49-F238E27FC236}">
+                <a16:creationId xmlns:a16="http://schemas.microsoft.com/office/drawing/2014/main" id="{7BA9F5CF-0241-2A1D-A011-0D7B303D7DD5}"/>
+              </a:ext>
+            </a:extLst>
+          </p:cNvPr>
+          <p:cNvSpPr/>
+          <p:nvPr/>
+        </p:nvSpPr>
+        <p:spPr>
+          <a:xfrm>
+            <a:off x="2400305" y="2773367"/>
+            <a:ext cx="190748" cy="187869"/>
+          </a:xfrm>
+          <a:prstGeom prst="ellipse">
+            <a:avLst/>
+          </a:prstGeom>
+          <a:solidFill>
+            <a:schemeClr val="accent2"/>
+          </a:solidFill>
+          <a:ln>
+            <a:noFill/>
+          </a:ln>
+        </p:spPr>
+        <p:style>
+          <a:lnRef idx="1">
+            <a:schemeClr val="accent1"/>
+          </a:lnRef>
+          <a:fillRef idx="3">
+            <a:schemeClr val="accent1"/>
+          </a:fillRef>
+          <a:effectRef idx="2">
+            <a:schemeClr val="accent1"/>
+          </a:effectRef>
+          <a:fontRef idx="minor">
+            <a:schemeClr val="lt1"/>
+          </a:fontRef>
+        </p:style>
+        <p:txBody>
+          <a:bodyPr rtlCol="0" anchor="ctr"/>
+          <a:lstStyle/>
+          <a:p>
+            <a:pPr algn="ctr"/>
+            <a:endParaRPr lang="en-US" b="1" dirty="0">
+              <a:solidFill>
+                <a:srgbClr val="0E4F83"/>
+              </a:solidFill>
+            </a:endParaRPr>
+          </a:p>
+        </p:txBody>
+      </p:sp>
+      <p:sp>
+        <p:nvSpPr>
+          <p:cNvPr id="39" name="Oval 38">
+            <a:extLst>
+              <a:ext uri="{FF2B5EF4-FFF2-40B4-BE49-F238E27FC236}">
+                <a16:creationId xmlns:a16="http://schemas.microsoft.com/office/drawing/2014/main" id="{5E3F91F6-ECBE-40BC-CC12-B61759678275}"/>
+              </a:ext>
+            </a:extLst>
+          </p:cNvPr>
+          <p:cNvSpPr/>
+          <p:nvPr/>
+        </p:nvSpPr>
+        <p:spPr>
+          <a:xfrm>
+            <a:off x="2400305" y="3110213"/>
+            <a:ext cx="190748" cy="187869"/>
+          </a:xfrm>
+          <a:prstGeom prst="ellipse">
+            <a:avLst/>
+          </a:prstGeom>
+          <a:solidFill>
+            <a:schemeClr val="accent2"/>
+          </a:solidFill>
+          <a:ln>
+            <a:noFill/>
+          </a:ln>
+        </p:spPr>
+        <p:style>
+          <a:lnRef idx="1">
+            <a:schemeClr val="accent1"/>
+          </a:lnRef>
+          <a:fillRef idx="3">
+            <a:schemeClr val="accent1"/>
+          </a:fillRef>
+          <a:effectRef idx="2">
+            <a:schemeClr val="accent1"/>
+          </a:effectRef>
+          <a:fontRef idx="minor">
+            <a:schemeClr val="lt1"/>
+          </a:fontRef>
+        </p:style>
+        <p:txBody>
+          <a:bodyPr rtlCol="0" anchor="ctr"/>
+          <a:lstStyle/>
+          <a:p>
+            <a:pPr algn="ctr"/>
+            <a:endParaRPr lang="en-US" b="1" dirty="0">
+              <a:solidFill>
+                <a:srgbClr val="0E4F83"/>
+              </a:solidFill>
+            </a:endParaRPr>
+          </a:p>
+        </p:txBody>
+      </p:sp>
+      <p:sp>
+        <p:nvSpPr>
+          <p:cNvPr id="40" name="TextBox 39">
+            <a:extLst>
+              <a:ext uri="{FF2B5EF4-FFF2-40B4-BE49-F238E27FC236}">
+                <a16:creationId xmlns:a16="http://schemas.microsoft.com/office/drawing/2014/main" id="{2DB2D161-0D91-C1AE-AD1D-C5F5AED33A37}"/>
+              </a:ext>
+            </a:extLst>
+          </p:cNvPr>
+          <p:cNvSpPr txBox="1"/>
+          <p:nvPr/>
+        </p:nvSpPr>
+        <p:spPr>
+          <a:xfrm>
+            <a:off x="2389542" y="3298082"/>
+            <a:ext cx="181669" cy="553998"/>
+          </a:xfrm>
+          <a:prstGeom prst="rect">
+            <a:avLst/>
+          </a:prstGeom>
+          <a:noFill/>
+        </p:spPr>
+        <p:txBody>
+          <a:bodyPr wrap="square" rtlCol="0">
+            <a:spAutoFit/>
+          </a:bodyPr>
+          <a:lstStyle/>
+          <a:p>
+            <a:r>
+              <a:rPr lang="en-US" sz="1000" b="1" dirty="0"/>
+              <a:t>.</a:t>
+            </a:r>
+          </a:p>
+          <a:p>
+            <a:r>
+              <a:rPr lang="en-US" sz="1000" b="1" dirty="0"/>
+              <a:t>.</a:t>
+            </a:r>
+          </a:p>
+          <a:p>
+            <a:r>
+              <a:rPr lang="en-US" sz="1000" b="1" dirty="0"/>
+              <a:t>.</a:t>
+            </a:r>
+          </a:p>
+        </p:txBody>
+      </p:sp>
+      <p:sp>
+        <p:nvSpPr>
+          <p:cNvPr id="41" name="Oval 40">
+            <a:extLst>
+              <a:ext uri="{FF2B5EF4-FFF2-40B4-BE49-F238E27FC236}">
+                <a16:creationId xmlns:a16="http://schemas.microsoft.com/office/drawing/2014/main" id="{C2A64087-4FDC-05D5-BF20-EDDE27380868}"/>
+              </a:ext>
+            </a:extLst>
+          </p:cNvPr>
+          <p:cNvSpPr/>
+          <p:nvPr/>
+        </p:nvSpPr>
+        <p:spPr>
+          <a:xfrm>
+            <a:off x="2400305" y="3890787"/>
+            <a:ext cx="190748" cy="187869"/>
+          </a:xfrm>
+          <a:prstGeom prst="ellipse">
+            <a:avLst/>
+          </a:prstGeom>
+          <a:solidFill>
+            <a:schemeClr val="accent2"/>
+          </a:solidFill>
+          <a:ln>
+            <a:noFill/>
+          </a:ln>
+        </p:spPr>
+        <p:style>
+          <a:lnRef idx="1">
+            <a:schemeClr val="accent1"/>
+          </a:lnRef>
+          <a:fillRef idx="3">
+            <a:schemeClr val="accent1"/>
+          </a:fillRef>
+          <a:effectRef idx="2">
+            <a:schemeClr val="accent1"/>
+          </a:effectRef>
+          <a:fontRef idx="minor">
+            <a:schemeClr val="lt1"/>
+          </a:fontRef>
+        </p:style>
+        <p:txBody>
+          <a:bodyPr rtlCol="0" anchor="ctr"/>
+          <a:lstStyle/>
+          <a:p>
+            <a:pPr algn="ctr"/>
+            <a:endParaRPr lang="en-US" b="1" dirty="0">
+              <a:solidFill>
+                <a:srgbClr val="0E4F83"/>
+              </a:solidFill>
+            </a:endParaRPr>
+          </a:p>
+        </p:txBody>
+      </p:sp>
+      <p:sp>
+        <p:nvSpPr>
+          <p:cNvPr id="42" name="Oval 41">
+            <a:extLst>
+              <a:ext uri="{FF2B5EF4-FFF2-40B4-BE49-F238E27FC236}">
+                <a16:creationId xmlns:a16="http://schemas.microsoft.com/office/drawing/2014/main" id="{DB402652-A266-7E6F-84A3-19E083E670AF}"/>
+              </a:ext>
+            </a:extLst>
+          </p:cNvPr>
+          <p:cNvSpPr/>
+          <p:nvPr/>
+        </p:nvSpPr>
+        <p:spPr>
+          <a:xfrm>
+            <a:off x="3648354" y="2248285"/>
+            <a:ext cx="190748" cy="187869"/>
+          </a:xfrm>
+          <a:prstGeom prst="ellipse">
+            <a:avLst/>
+          </a:prstGeom>
+          <a:solidFill>
+            <a:schemeClr val="accent2"/>
+          </a:solidFill>
+          <a:ln>
+            <a:noFill/>
+          </a:ln>
+        </p:spPr>
+        <p:style>
+          <a:lnRef idx="1">
+            <a:schemeClr val="accent1"/>
+          </a:lnRef>
+          <a:fillRef idx="3">
+            <a:schemeClr val="accent1"/>
+          </a:fillRef>
+          <a:effectRef idx="2">
+            <a:schemeClr val="accent1"/>
+          </a:effectRef>
+          <a:fontRef idx="minor">
+            <a:schemeClr val="lt1"/>
+          </a:fontRef>
+        </p:style>
+        <p:txBody>
+          <a:bodyPr rtlCol="0" anchor="ctr"/>
+          <a:lstStyle/>
+          <a:p>
+            <a:pPr algn="ctr"/>
+            <a:endParaRPr lang="en-US" b="1" dirty="0">
+              <a:solidFill>
+                <a:srgbClr val="0E4F83"/>
+              </a:solidFill>
+            </a:endParaRPr>
+          </a:p>
+        </p:txBody>
+      </p:sp>
+      <p:sp>
+        <p:nvSpPr>
+          <p:cNvPr id="43" name="Oval 42">
+            <a:extLst>
+              <a:ext uri="{FF2B5EF4-FFF2-40B4-BE49-F238E27FC236}">
+                <a16:creationId xmlns:a16="http://schemas.microsoft.com/office/drawing/2014/main" id="{0A1E4A43-6AF1-F2FF-AAD1-643F07C61E99}"/>
+              </a:ext>
+            </a:extLst>
+          </p:cNvPr>
+          <p:cNvSpPr/>
+          <p:nvPr/>
+        </p:nvSpPr>
+        <p:spPr>
+          <a:xfrm>
+            <a:off x="3648354" y="3505529"/>
+            <a:ext cx="190748" cy="187869"/>
+          </a:xfrm>
+          <a:prstGeom prst="ellipse">
+            <a:avLst/>
+          </a:prstGeom>
+          <a:solidFill>
+            <a:schemeClr val="accent2"/>
+          </a:solidFill>
+          <a:ln>
+            <a:noFill/>
+          </a:ln>
+        </p:spPr>
+        <p:style>
+          <a:lnRef idx="1">
+            <a:schemeClr val="accent1"/>
+          </a:lnRef>
+          <a:fillRef idx="3">
+            <a:schemeClr val="accent1"/>
+          </a:fillRef>
+          <a:effectRef idx="2">
+            <a:schemeClr val="accent1"/>
+          </a:effectRef>
+          <a:fontRef idx="minor">
+            <a:schemeClr val="lt1"/>
+          </a:fontRef>
+        </p:style>
+        <p:txBody>
+          <a:bodyPr rtlCol="0" anchor="ctr"/>
+          <a:lstStyle/>
+          <a:p>
+            <a:pPr algn="ctr"/>
+            <a:endParaRPr lang="en-US" b="1" dirty="0">
+              <a:solidFill>
+                <a:srgbClr val="0E4F83"/>
+              </a:solidFill>
+            </a:endParaRPr>
+          </a:p>
+        </p:txBody>
+      </p:sp>
+      <p:sp>
+        <p:nvSpPr>
+          <p:cNvPr id="44" name="Oval 43">
+            <a:extLst>
+              <a:ext uri="{FF2B5EF4-FFF2-40B4-BE49-F238E27FC236}">
+                <a16:creationId xmlns:a16="http://schemas.microsoft.com/office/drawing/2014/main" id="{C701BB61-91FD-F526-96EC-B27215E0E31C}"/>
+              </a:ext>
+            </a:extLst>
+          </p:cNvPr>
+          <p:cNvSpPr/>
+          <p:nvPr/>
+        </p:nvSpPr>
+        <p:spPr>
+          <a:xfrm>
+            <a:off x="3648354" y="2893140"/>
+            <a:ext cx="190748" cy="187869"/>
+          </a:xfrm>
+          <a:prstGeom prst="ellipse">
+            <a:avLst/>
+          </a:prstGeom>
+          <a:solidFill>
+            <a:schemeClr val="accent2"/>
+          </a:solidFill>
+          <a:ln>
+            <a:noFill/>
+          </a:ln>
+        </p:spPr>
+        <p:style>
+          <a:lnRef idx="1">
+            <a:schemeClr val="accent1"/>
+          </a:lnRef>
+          <a:fillRef idx="3">
+            <a:schemeClr val="accent1"/>
+          </a:fillRef>
+          <a:effectRef idx="2">
+            <a:schemeClr val="accent1"/>
+          </a:effectRef>
+          <a:fontRef idx="minor">
+            <a:schemeClr val="lt1"/>
+          </a:fontRef>
+        </p:style>
+        <p:txBody>
+          <a:bodyPr rtlCol="0" anchor="ctr"/>
+          <a:lstStyle/>
+          <a:p>
+            <a:pPr algn="ctr"/>
+            <a:endParaRPr lang="en-US" b="1" dirty="0">
+              <a:solidFill>
+                <a:srgbClr val="0E4F83"/>
+              </a:solidFill>
+            </a:endParaRPr>
+          </a:p>
+        </p:txBody>
+      </p:sp>
+      <p:sp>
+        <p:nvSpPr>
+          <p:cNvPr id="45" name="Oval 44">
+            <a:extLst>
+              <a:ext uri="{FF2B5EF4-FFF2-40B4-BE49-F238E27FC236}">
+                <a16:creationId xmlns:a16="http://schemas.microsoft.com/office/drawing/2014/main" id="{6DE75BE1-BEC1-54DF-0742-27BE0BDAF06D}"/>
+              </a:ext>
+            </a:extLst>
+          </p:cNvPr>
+          <p:cNvSpPr/>
+          <p:nvPr/>
+        </p:nvSpPr>
+        <p:spPr>
+          <a:xfrm>
+            <a:off x="5269477" y="2567794"/>
+            <a:ext cx="190748" cy="187869"/>
+          </a:xfrm>
+          <a:prstGeom prst="ellipse">
+            <a:avLst/>
+          </a:prstGeom>
+          <a:solidFill>
+            <a:schemeClr val="accent2"/>
+          </a:solidFill>
+          <a:ln>
+            <a:noFill/>
+          </a:ln>
+        </p:spPr>
+        <p:style>
+          <a:lnRef idx="1">
+            <a:schemeClr val="accent1"/>
+          </a:lnRef>
+          <a:fillRef idx="3">
+            <a:schemeClr val="accent1"/>
+          </a:fillRef>
+          <a:effectRef idx="2">
+            <a:schemeClr val="accent1"/>
+          </a:effectRef>
+          <a:fontRef idx="minor">
+            <a:schemeClr val="lt1"/>
+          </a:fontRef>
+        </p:style>
+        <p:txBody>
+          <a:bodyPr rtlCol="0" anchor="ctr"/>
+          <a:lstStyle/>
+          <a:p>
+            <a:pPr algn="ctr"/>
+            <a:endParaRPr lang="en-US" b="1" dirty="0">
+              <a:solidFill>
+                <a:srgbClr val="0E4F83"/>
+              </a:solidFill>
+            </a:endParaRPr>
+          </a:p>
+        </p:txBody>
+      </p:sp>
+      <p:sp>
+        <p:nvSpPr>
+          <p:cNvPr id="46" name="TextBox 45">
+            <a:extLst>
+              <a:ext uri="{FF2B5EF4-FFF2-40B4-BE49-F238E27FC236}">
+                <a16:creationId xmlns:a16="http://schemas.microsoft.com/office/drawing/2014/main" id="{E838C156-C555-91E2-8DCB-2901782A7598}"/>
+              </a:ext>
+            </a:extLst>
+          </p:cNvPr>
+          <p:cNvSpPr txBox="1"/>
+          <p:nvPr/>
+        </p:nvSpPr>
+        <p:spPr>
+          <a:xfrm>
+            <a:off x="6101644" y="2545727"/>
+            <a:ext cx="2049233" cy="246221"/>
+          </a:xfrm>
+          <a:prstGeom prst="rect">
+            <a:avLst/>
+          </a:prstGeom>
+          <a:noFill/>
+        </p:spPr>
+        <p:txBody>
+          <a:bodyPr wrap="square" rtlCol="0">
+            <a:spAutoFit/>
+          </a:bodyPr>
+          <a:lstStyle/>
+          <a:p>
+            <a:r>
+              <a:rPr lang="en-US" sz="1000" dirty="0">
+                <a:latin typeface="Calibri" panose="020F0502020204030204" pitchFamily="34" charset="0"/>
+                <a:cs typeface="Calibri" panose="020F0502020204030204" pitchFamily="34" charset="0"/>
+              </a:rPr>
+              <a:t>Compliant? </a:t>
+            </a:r>
+            <a:r>
+              <a:rPr lang="en-US" sz="1000" dirty="0">
+                <a:solidFill>
+                  <a:schemeClr val="accent5"/>
+                </a:solidFill>
+                <a:latin typeface="Calibri" panose="020F0502020204030204" pitchFamily="34" charset="0"/>
+                <a:cs typeface="Calibri" panose="020F0502020204030204" pitchFamily="34" charset="0"/>
+              </a:rPr>
+              <a:t>0-69 = No</a:t>
+            </a:r>
+            <a:r>
+              <a:rPr lang="en-US" sz="1000" dirty="0">
+                <a:latin typeface="Calibri" panose="020F0502020204030204" pitchFamily="34" charset="0"/>
+                <a:cs typeface="Calibri" panose="020F0502020204030204" pitchFamily="34" charset="0"/>
+              </a:rPr>
+              <a:t>, </a:t>
+            </a:r>
+            <a:r>
+              <a:rPr lang="en-US" sz="1000" dirty="0">
+                <a:solidFill>
+                  <a:schemeClr val="accent3"/>
+                </a:solidFill>
+                <a:latin typeface="Calibri" panose="020F0502020204030204" pitchFamily="34" charset="0"/>
+                <a:cs typeface="Calibri" panose="020F0502020204030204" pitchFamily="34" charset="0"/>
+              </a:rPr>
+              <a:t>70-100 = Yes</a:t>
+            </a:r>
+          </a:p>
+        </p:txBody>
+      </p:sp>
+      <p:cxnSp>
+        <p:nvCxnSpPr>
+          <p:cNvPr id="50" name="Straight Connector 49">
+            <a:extLst>
+              <a:ext uri="{FF2B5EF4-FFF2-40B4-BE49-F238E27FC236}">
+                <a16:creationId xmlns:a16="http://schemas.microsoft.com/office/drawing/2014/main" id="{64724FDB-318C-83B8-8310-6573CC18471D}"/>
+              </a:ext>
+            </a:extLst>
+          </p:cNvPr>
+          <p:cNvCxnSpPr>
+            <a:cxnSpLocks/>
+            <a:stCxn id="5" idx="6"/>
+            <a:endCxn id="34" idx="1"/>
+          </p:cNvCxnSpPr>
+          <p:nvPr/>
+        </p:nvCxnSpPr>
+        <p:spPr>
+          <a:xfrm>
+            <a:off x="2591053" y="1379735"/>
+            <a:ext cx="1085235" cy="285474"/>
+          </a:xfrm>
+          <a:prstGeom prst="line">
+            <a:avLst/>
+          </a:prstGeom>
+        </p:spPr>
+        <p:style>
+          <a:lnRef idx="2">
+            <a:schemeClr val="dk1"/>
+          </a:lnRef>
+          <a:fillRef idx="0">
+            <a:schemeClr val="dk1"/>
+          </a:fillRef>
+          <a:effectRef idx="1">
+            <a:schemeClr val="dk1"/>
+          </a:effectRef>
+          <a:fontRef idx="minor">
+            <a:schemeClr val="tx1"/>
+          </a:fontRef>
+        </p:style>
+      </p:cxnSp>
+      <p:cxnSp>
+        <p:nvCxnSpPr>
+          <p:cNvPr id="53" name="Straight Connector 52">
+            <a:extLst>
+              <a:ext uri="{FF2B5EF4-FFF2-40B4-BE49-F238E27FC236}">
+                <a16:creationId xmlns:a16="http://schemas.microsoft.com/office/drawing/2014/main" id="{5F154ECD-AFF0-005C-0563-5E27B12EC4E0}"/>
+              </a:ext>
+            </a:extLst>
+          </p:cNvPr>
+          <p:cNvCxnSpPr>
+            <a:stCxn id="35" idx="6"/>
+            <a:endCxn id="34" idx="2"/>
+          </p:cNvCxnSpPr>
+          <p:nvPr/>
+        </p:nvCxnSpPr>
+        <p:spPr>
+          <a:xfrm>
+            <a:off x="2591053" y="1731631"/>
+            <a:ext cx="1057301" cy="0"/>
+          </a:xfrm>
+          <a:prstGeom prst="line">
+            <a:avLst/>
+          </a:prstGeom>
+        </p:spPr>
+        <p:style>
+          <a:lnRef idx="2">
+            <a:schemeClr val="dk1"/>
+          </a:lnRef>
+          <a:fillRef idx="0">
+            <a:schemeClr val="dk1"/>
+          </a:fillRef>
+          <a:effectRef idx="1">
+            <a:schemeClr val="dk1"/>
+          </a:effectRef>
+          <a:fontRef idx="minor">
+            <a:schemeClr val="tx1"/>
+          </a:fontRef>
+        </p:style>
+      </p:cxnSp>
+      <p:cxnSp>
+        <p:nvCxnSpPr>
+          <p:cNvPr id="57" name="Straight Connector 56">
+            <a:extLst>
+              <a:ext uri="{FF2B5EF4-FFF2-40B4-BE49-F238E27FC236}">
+                <a16:creationId xmlns:a16="http://schemas.microsoft.com/office/drawing/2014/main" id="{632D46EE-D7F1-0CA9-3100-A76E8E71B161}"/>
+              </a:ext>
+            </a:extLst>
+          </p:cNvPr>
+          <p:cNvCxnSpPr>
+            <a:cxnSpLocks/>
+            <a:stCxn id="36" idx="6"/>
+            <a:endCxn id="34" idx="3"/>
+          </p:cNvCxnSpPr>
+          <p:nvPr/>
+        </p:nvCxnSpPr>
+        <p:spPr>
+          <a:xfrm flipV="1">
+            <a:off x="2591053" y="1798052"/>
+            <a:ext cx="1085235" cy="287596"/>
+          </a:xfrm>
+          <a:prstGeom prst="line">
+            <a:avLst/>
+          </a:prstGeom>
+        </p:spPr>
+        <p:style>
+          <a:lnRef idx="2">
+            <a:schemeClr val="dk1"/>
+          </a:lnRef>
+          <a:fillRef idx="0">
+            <a:schemeClr val="dk1"/>
+          </a:fillRef>
+          <a:effectRef idx="1">
+            <a:schemeClr val="dk1"/>
+          </a:effectRef>
+          <a:fontRef idx="minor">
+            <a:schemeClr val="tx1"/>
+          </a:fontRef>
+        </p:style>
+      </p:cxnSp>
+      <p:cxnSp>
+        <p:nvCxnSpPr>
+          <p:cNvPr id="60" name="Straight Connector 59">
+            <a:extLst>
+              <a:ext uri="{FF2B5EF4-FFF2-40B4-BE49-F238E27FC236}">
+                <a16:creationId xmlns:a16="http://schemas.microsoft.com/office/drawing/2014/main" id="{0CA0305E-ED41-2958-361B-31D237844F0E}"/>
+              </a:ext>
+            </a:extLst>
+          </p:cNvPr>
+          <p:cNvCxnSpPr>
+            <a:stCxn id="37" idx="7"/>
+            <a:endCxn id="34" idx="4"/>
+          </p:cNvCxnSpPr>
+          <p:nvPr/>
+        </p:nvCxnSpPr>
+        <p:spPr>
+          <a:xfrm flipV="1">
+            <a:off x="2563119" y="1825565"/>
+            <a:ext cx="1180609" cy="638469"/>
+          </a:xfrm>
+          <a:prstGeom prst="line">
+            <a:avLst/>
+          </a:prstGeom>
+        </p:spPr>
+        <p:style>
+          <a:lnRef idx="2">
+            <a:schemeClr val="dk1"/>
+          </a:lnRef>
+          <a:fillRef idx="0">
+            <a:schemeClr val="dk1"/>
+          </a:fillRef>
+          <a:effectRef idx="1">
+            <a:schemeClr val="dk1"/>
+          </a:effectRef>
+          <a:fontRef idx="minor">
+            <a:schemeClr val="tx1"/>
+          </a:fontRef>
+        </p:style>
+      </p:cxnSp>
+      <p:cxnSp>
+        <p:nvCxnSpPr>
+          <p:cNvPr id="63" name="Straight Connector 62">
+            <a:extLst>
+              <a:ext uri="{FF2B5EF4-FFF2-40B4-BE49-F238E27FC236}">
+                <a16:creationId xmlns:a16="http://schemas.microsoft.com/office/drawing/2014/main" id="{3BB454BF-E103-1540-D895-3C410D854335}"/>
+              </a:ext>
+            </a:extLst>
+          </p:cNvPr>
+          <p:cNvCxnSpPr>
+            <a:stCxn id="38" idx="7"/>
+            <a:endCxn id="34" idx="4"/>
+          </p:cNvCxnSpPr>
+          <p:nvPr/>
+        </p:nvCxnSpPr>
+        <p:spPr>
+          <a:xfrm flipV="1">
+            <a:off x="2563119" y="1825565"/>
+            <a:ext cx="1180609" cy="975315"/>
+          </a:xfrm>
+          <a:prstGeom prst="line">
+            <a:avLst/>
+          </a:prstGeom>
+        </p:spPr>
+        <p:style>
+          <a:lnRef idx="2">
+            <a:schemeClr val="dk1"/>
+          </a:lnRef>
+          <a:fillRef idx="0">
+            <a:schemeClr val="dk1"/>
+          </a:fillRef>
+          <a:effectRef idx="1">
+            <a:schemeClr val="dk1"/>
+          </a:effectRef>
+          <a:fontRef idx="minor">
+            <a:schemeClr val="tx1"/>
+          </a:fontRef>
+        </p:style>
+      </p:cxnSp>
+      <p:cxnSp>
+        <p:nvCxnSpPr>
+          <p:cNvPr id="66" name="Straight Connector 65">
+            <a:extLst>
+              <a:ext uri="{FF2B5EF4-FFF2-40B4-BE49-F238E27FC236}">
+                <a16:creationId xmlns:a16="http://schemas.microsoft.com/office/drawing/2014/main" id="{F8387EFF-A435-2660-1ED6-799F7C9F1B02}"/>
+              </a:ext>
+            </a:extLst>
+          </p:cNvPr>
+          <p:cNvCxnSpPr>
+            <a:stCxn id="39" idx="7"/>
+            <a:endCxn id="34" idx="4"/>
+          </p:cNvCxnSpPr>
+          <p:nvPr/>
+        </p:nvCxnSpPr>
+        <p:spPr>
+          <a:xfrm flipV="1">
+            <a:off x="2563119" y="1825565"/>
+            <a:ext cx="1180609" cy="1312161"/>
+          </a:xfrm>
+          <a:prstGeom prst="line">
+            <a:avLst/>
+          </a:prstGeom>
+        </p:spPr>
+        <p:style>
+          <a:lnRef idx="2">
+            <a:schemeClr val="dk1"/>
+          </a:lnRef>
+          <a:fillRef idx="0">
+            <a:schemeClr val="dk1"/>
+          </a:fillRef>
+          <a:effectRef idx="1">
+            <a:schemeClr val="dk1"/>
+          </a:effectRef>
+          <a:fontRef idx="minor">
+            <a:schemeClr val="tx1"/>
+          </a:fontRef>
+        </p:style>
+      </p:cxnSp>
+      <p:cxnSp>
+        <p:nvCxnSpPr>
+          <p:cNvPr id="68" name="Straight Connector 67">
+            <a:extLst>
+              <a:ext uri="{FF2B5EF4-FFF2-40B4-BE49-F238E27FC236}">
+                <a16:creationId xmlns:a16="http://schemas.microsoft.com/office/drawing/2014/main" id="{7AD40B38-24D4-8CD5-2381-55EA48083A9B}"/>
+              </a:ext>
+            </a:extLst>
+          </p:cNvPr>
+          <p:cNvCxnSpPr>
+            <a:cxnSpLocks/>
+            <a:stCxn id="41" idx="7"/>
+            <a:endCxn id="34" idx="4"/>
+          </p:cNvCxnSpPr>
+          <p:nvPr/>
+        </p:nvCxnSpPr>
+        <p:spPr>
+          <a:xfrm flipV="1">
+            <a:off x="2563119" y="1825565"/>
+            <a:ext cx="1180609" cy="2092735"/>
+          </a:xfrm>
+          <a:prstGeom prst="line">
+            <a:avLst/>
+          </a:prstGeom>
+        </p:spPr>
+        <p:style>
+          <a:lnRef idx="2">
+            <a:schemeClr val="dk1"/>
+          </a:lnRef>
+          <a:fillRef idx="0">
+            <a:schemeClr val="dk1"/>
+          </a:fillRef>
+          <a:effectRef idx="1">
+            <a:schemeClr val="dk1"/>
+          </a:effectRef>
+          <a:fontRef idx="minor">
+            <a:schemeClr val="tx1"/>
+          </a:fontRef>
+        </p:style>
+      </p:cxnSp>
+      <p:cxnSp>
+        <p:nvCxnSpPr>
+          <p:cNvPr id="71" name="Straight Connector 70">
+            <a:extLst>
+              <a:ext uri="{FF2B5EF4-FFF2-40B4-BE49-F238E27FC236}">
+                <a16:creationId xmlns:a16="http://schemas.microsoft.com/office/drawing/2014/main" id="{9C2F1EBF-E1ED-97E4-B5DF-02AF6E3B03CC}"/>
+              </a:ext>
+            </a:extLst>
+          </p:cNvPr>
+          <p:cNvCxnSpPr>
+            <a:stCxn id="42" idx="6"/>
+            <a:endCxn id="45" idx="1"/>
+          </p:cNvCxnSpPr>
+          <p:nvPr/>
+        </p:nvCxnSpPr>
+        <p:spPr>
+          <a:xfrm>
+            <a:off x="3839102" y="2342220"/>
+            <a:ext cx="1458309" cy="253087"/>
+          </a:xfrm>
+          <a:prstGeom prst="line">
+            <a:avLst/>
+          </a:prstGeom>
+        </p:spPr>
+        <p:style>
+          <a:lnRef idx="2">
+            <a:schemeClr val="dk1"/>
+          </a:lnRef>
+          <a:fillRef idx="0">
+            <a:schemeClr val="dk1"/>
+          </a:fillRef>
+          <a:effectRef idx="1">
+            <a:schemeClr val="dk1"/>
+          </a:effectRef>
+          <a:fontRef idx="minor">
+            <a:schemeClr val="tx1"/>
+          </a:fontRef>
+        </p:style>
+      </p:cxnSp>
+      <p:cxnSp>
+        <p:nvCxnSpPr>
+          <p:cNvPr id="73" name="Straight Connector 72">
+            <a:extLst>
+              <a:ext uri="{FF2B5EF4-FFF2-40B4-BE49-F238E27FC236}">
+                <a16:creationId xmlns:a16="http://schemas.microsoft.com/office/drawing/2014/main" id="{F9DB2AAE-28FC-AD9F-460C-DA35A7612B3C}"/>
+              </a:ext>
+            </a:extLst>
+          </p:cNvPr>
+          <p:cNvCxnSpPr>
+            <a:cxnSpLocks/>
+            <a:stCxn id="44" idx="6"/>
+            <a:endCxn id="45" idx="2"/>
+          </p:cNvCxnSpPr>
+          <p:nvPr/>
+        </p:nvCxnSpPr>
+        <p:spPr>
+          <a:xfrm flipV="1">
+            <a:off x="3839102" y="2661729"/>
+            <a:ext cx="1430375" cy="325346"/>
+          </a:xfrm>
+          <a:prstGeom prst="line">
+            <a:avLst/>
+          </a:prstGeom>
+        </p:spPr>
+        <p:style>
+          <a:lnRef idx="2">
+            <a:schemeClr val="dk1"/>
+          </a:lnRef>
+          <a:fillRef idx="0">
+            <a:schemeClr val="dk1"/>
+          </a:fillRef>
+          <a:effectRef idx="1">
+            <a:schemeClr val="dk1"/>
+          </a:effectRef>
+          <a:fontRef idx="minor">
+            <a:schemeClr val="tx1"/>
+          </a:fontRef>
+        </p:style>
+      </p:cxnSp>
+      <p:cxnSp>
+        <p:nvCxnSpPr>
+          <p:cNvPr id="76" name="Straight Connector 75">
+            <a:extLst>
+              <a:ext uri="{FF2B5EF4-FFF2-40B4-BE49-F238E27FC236}">
+                <a16:creationId xmlns:a16="http://schemas.microsoft.com/office/drawing/2014/main" id="{736A40BE-D625-493E-49DD-D63CEC99670E}"/>
+              </a:ext>
+            </a:extLst>
+          </p:cNvPr>
+          <p:cNvCxnSpPr>
+            <a:cxnSpLocks/>
+            <a:stCxn id="43" idx="7"/>
+            <a:endCxn id="45" idx="3"/>
+          </p:cNvCxnSpPr>
+          <p:nvPr/>
+        </p:nvCxnSpPr>
+        <p:spPr>
+          <a:xfrm flipV="1">
+            <a:off x="3811168" y="2728150"/>
+            <a:ext cx="1486243" cy="804892"/>
+          </a:xfrm>
+          <a:prstGeom prst="line">
+            <a:avLst/>
+          </a:prstGeom>
+        </p:spPr>
+        <p:style>
+          <a:lnRef idx="2">
+            <a:schemeClr val="dk1"/>
+          </a:lnRef>
+          <a:fillRef idx="0">
+            <a:schemeClr val="dk1"/>
+          </a:fillRef>
+          <a:effectRef idx="1">
+            <a:schemeClr val="dk1"/>
+          </a:effectRef>
+          <a:fontRef idx="minor">
+            <a:schemeClr val="tx1"/>
+          </a:fontRef>
+        </p:style>
+      </p:cxnSp>
+      <p:cxnSp>
+        <p:nvCxnSpPr>
+          <p:cNvPr id="82" name="Straight Connector 81">
+            <a:extLst>
+              <a:ext uri="{FF2B5EF4-FFF2-40B4-BE49-F238E27FC236}">
+                <a16:creationId xmlns:a16="http://schemas.microsoft.com/office/drawing/2014/main" id="{BD5C3014-F31C-023D-4C9A-286D1F7F9741}"/>
+              </a:ext>
+            </a:extLst>
+          </p:cNvPr>
+          <p:cNvCxnSpPr>
+            <a:cxnSpLocks/>
+            <a:stCxn id="45" idx="6"/>
+          </p:cNvCxnSpPr>
+          <p:nvPr/>
+        </p:nvCxnSpPr>
+        <p:spPr>
+          <a:xfrm>
+            <a:off x="5460225" y="2661729"/>
+            <a:ext cx="641419" cy="0"/>
+          </a:xfrm>
+          <a:prstGeom prst="line">
+            <a:avLst/>
+          </a:prstGeom>
+        </p:spPr>
+        <p:style>
+          <a:lnRef idx="2">
+            <a:schemeClr val="accent6"/>
+          </a:lnRef>
+          <a:fillRef idx="0">
+            <a:schemeClr val="accent6"/>
+          </a:fillRef>
+          <a:effectRef idx="1">
+            <a:schemeClr val="accent6"/>
+          </a:effectRef>
+          <a:fontRef idx="minor">
+            <a:schemeClr val="tx1"/>
+          </a:fontRef>
+        </p:style>
+      </p:cxnSp>
     </p:spTree>
     <p:extLst>
       <p:ext uri="{BB962C8B-B14F-4D97-AF65-F5344CB8AC3E}">
@@ -7978,6 +9895,12 @@
 </file>
 
 <file path=customXml/item1.xml><?xml version="1.0" encoding="utf-8"?>
+<p:properties xmlns:p="http://schemas.microsoft.com/office/2006/metadata/properties" xmlns:xsi="http://www.w3.org/2001/XMLSchema-instance" xmlns:pc="http://schemas.microsoft.com/office/infopath/2007/PartnerControls">
+  <documentManagement/>
+</p:properties>
+</file>
+
+<file path=customXml/item2.xml><?xml version="1.0" encoding="utf-8"?>
 <ct:contentTypeSchema xmlns:ct="http://schemas.microsoft.com/office/2006/metadata/contentType" xmlns:ma="http://schemas.microsoft.com/office/2006/metadata/properties/metaAttributes" ct:_="" ma:_="" ma:contentTypeName="Document" ma:contentTypeID="0x010100C11066598DA2094897C17F025BEB5C33" ma:contentTypeVersion="11" ma:contentTypeDescription="Create a new document." ma:contentTypeScope="" ma:versionID="c132620416a636482ab79dc02cb4beda">
   <xsd:schema xmlns:xsd="http://www.w3.org/2001/XMLSchema" xmlns:xs="http://www.w3.org/2001/XMLSchema" xmlns:p="http://schemas.microsoft.com/office/2006/metadata/properties" xmlns:ns2="cc02a9f5-0e8f-478d-ae46-fce6cd025606" xmlns:ns3="5ed103a9-c213-4e89-b04a-978a9c9d0ecb" targetNamespace="http://schemas.microsoft.com/office/2006/metadata/properties" ma:root="true" ma:fieldsID="25d1ba42b03243f6fad1194b6d2737ac" ns2:_="" ns3:_="">
     <xsd:import namespace="cc02a9f5-0e8f-478d-ae46-fce6cd025606"/>
@@ -8186,12 +10109,6 @@
 </ct:contentTypeSchema>
 </file>
 
-<file path=customXml/item2.xml><?xml version="1.0" encoding="utf-8"?>
-<p:properties xmlns:p="http://schemas.microsoft.com/office/2006/metadata/properties" xmlns:xsi="http://www.w3.org/2001/XMLSchema-instance" xmlns:pc="http://schemas.microsoft.com/office/infopath/2007/PartnerControls">
-  <documentManagement/>
-</p:properties>
-</file>
-
 <file path=customXml/item3.xml><?xml version="1.0" encoding="utf-8"?>
 <?mso-contentType ?>
 <FormTemplates xmlns="http://schemas.microsoft.com/sharepoint/v3/contenttype/forms">
@@ -8202,6 +10119,23 @@
 </file>
 
 <file path=customXml/itemProps1.xml><?xml version="1.0" encoding="utf-8"?>
+<ds:datastoreItem xmlns:ds="http://schemas.openxmlformats.org/officeDocument/2006/customXml" ds:itemID="{10D81E0D-2C63-4EA5-9F60-BC113953F389}">
+  <ds:schemaRefs>
+    <ds:schemaRef ds:uri="http://www.w3.org/XML/1998/namespace"/>
+    <ds:schemaRef ds:uri="http://schemas.microsoft.com/office/infopath/2007/PartnerControls"/>
+    <ds:schemaRef ds:uri="http://schemas.microsoft.com/office/2006/documentManagement/types"/>
+    <ds:schemaRef ds:uri="http://purl.org/dc/dcmitype/"/>
+    <ds:schemaRef ds:uri="cc02a9f5-0e8f-478d-ae46-fce6cd025606"/>
+    <ds:schemaRef ds:uri="http://schemas.openxmlformats.org/package/2006/metadata/core-properties"/>
+    <ds:schemaRef ds:uri="http://schemas.microsoft.com/office/2006/metadata/properties"/>
+    <ds:schemaRef ds:uri="5ed103a9-c213-4e89-b04a-978a9c9d0ecb"/>
+    <ds:schemaRef ds:uri="http://purl.org/dc/terms/"/>
+    <ds:schemaRef ds:uri="http://purl.org/dc/elements/1.1/"/>
+  </ds:schemaRefs>
+</ds:datastoreItem>
+</file>
+
+<file path=customXml/itemProps2.xml><?xml version="1.0" encoding="utf-8"?>
 <ds:datastoreItem xmlns:ds="http://schemas.openxmlformats.org/officeDocument/2006/customXml" ds:itemID="{048D89ED-6A25-4B9D-BC75-65054FB7685E}">
   <ds:schemaRefs>
     <ds:schemaRef ds:uri="http://schemas.microsoft.com/office/2006/metadata/contentType"/>
@@ -8220,23 +10154,6 @@
 </ds:datastoreItem>
 </file>
 
-<file path=customXml/itemProps2.xml><?xml version="1.0" encoding="utf-8"?>
-<ds:datastoreItem xmlns:ds="http://schemas.openxmlformats.org/officeDocument/2006/customXml" ds:itemID="{10D81E0D-2C63-4EA5-9F60-BC113953F389}">
-  <ds:schemaRefs>
-    <ds:schemaRef ds:uri="http://www.w3.org/XML/1998/namespace"/>
-    <ds:schemaRef ds:uri="http://schemas.microsoft.com/office/infopath/2007/PartnerControls"/>
-    <ds:schemaRef ds:uri="http://schemas.microsoft.com/office/2006/documentManagement/types"/>
-    <ds:schemaRef ds:uri="http://purl.org/dc/dcmitype/"/>
-    <ds:schemaRef ds:uri="cc02a9f5-0e8f-478d-ae46-fce6cd025606"/>
-    <ds:schemaRef ds:uri="http://schemas.openxmlformats.org/package/2006/metadata/core-properties"/>
-    <ds:schemaRef ds:uri="http://schemas.microsoft.com/office/2006/metadata/properties"/>
-    <ds:schemaRef ds:uri="5ed103a9-c213-4e89-b04a-978a9c9d0ecb"/>
-    <ds:schemaRef ds:uri="http://purl.org/dc/terms/"/>
-    <ds:schemaRef ds:uri="http://purl.org/dc/elements/1.1/"/>
-  </ds:schemaRefs>
-</ds:datastoreItem>
-</file>
-
 <file path=customXml/itemProps3.xml><?xml version="1.0" encoding="utf-8"?>
 <ds:datastoreItem xmlns:ds="http://schemas.openxmlformats.org/officeDocument/2006/customXml" ds:itemID="{478A104F-5518-4387-A41C-C91F45F51F72}">
   <ds:schemaRefs>

</xml_diff>

<commit_message>
Connect top node in hidden layer to output layer in NN sketch
</commit_message>
<xml_diff>
--- a/gao_ai_proposal.pptx
+++ b/gao_ai_proposal.pptx
@@ -2828,7 +2828,7 @@
           <a:p>
             <a:fld id="{9C5B416F-12F7-8245-B7D4-D65FCD72D8E0}" type="datetimeFigureOut">
               <a:rPr lang="en-US" smtClean="0"/>
-              <a:t>7/20/23</a:t>
+              <a:t>7/24/23</a:t>
             </a:fld>
             <a:endParaRPr lang="en-US"/>
           </a:p>
@@ -2994,7 +2994,7 @@
           <a:p>
             <a:fld id="{24EA5F54-FBF3-1447-ACC7-2EF23A9C40CC}" type="datetimeFigureOut">
               <a:rPr lang="en-US" smtClean="0"/>
-              <a:t>7/20/23</a:t>
+              <a:t>7/24/23</a:t>
             </a:fld>
             <a:endParaRPr lang="en-US"/>
           </a:p>
@@ -8316,6 +8316,7 @@
             </a:extLst>
           </p:cNvPr>
           <p:cNvCxnSpPr>
+            <a:cxnSpLocks/>
             <a:stCxn id="42" idx="6"/>
             <a:endCxn id="45" idx="1"/>
           </p:cNvCxnSpPr>
@@ -8357,14 +8358,14 @@
           <p:cNvCxnSpPr>
             <a:cxnSpLocks/>
             <a:stCxn id="44" idx="6"/>
-            <a:endCxn id="45" idx="2"/>
+            <a:endCxn id="45" idx="3"/>
           </p:cNvCxnSpPr>
           <p:nvPr/>
         </p:nvCxnSpPr>
         <p:spPr>
           <a:xfrm flipV="1">
-            <a:off x="3839102" y="2661729"/>
-            <a:ext cx="1430375" cy="325346"/>
+            <a:off x="3839102" y="2728150"/>
+            <a:ext cx="1458309" cy="258925"/>
           </a:xfrm>
           <a:prstGeom prst="line">
             <a:avLst/>
@@ -8396,15 +8397,15 @@
           </p:cNvPr>
           <p:cNvCxnSpPr>
             <a:cxnSpLocks/>
-            <a:stCxn id="43" idx="7"/>
-            <a:endCxn id="45" idx="3"/>
+            <a:stCxn id="43" idx="6"/>
+            <a:endCxn id="45" idx="4"/>
           </p:cNvCxnSpPr>
           <p:nvPr/>
         </p:nvCxnSpPr>
         <p:spPr>
           <a:xfrm flipV="1">
-            <a:off x="3811168" y="2728150"/>
-            <a:ext cx="1486243" cy="804892"/>
+            <a:off x="3839102" y="2755663"/>
+            <a:ext cx="1525749" cy="843801"/>
           </a:xfrm>
           <a:prstGeom prst="line">
             <a:avLst/>
@@ -8458,6 +8459,46 @@
           </a:fillRef>
           <a:effectRef idx="1">
             <a:schemeClr val="accent6"/>
+          </a:effectRef>
+          <a:fontRef idx="minor">
+            <a:schemeClr val="tx1"/>
+          </a:fontRef>
+        </p:style>
+      </p:cxnSp>
+      <p:cxnSp>
+        <p:nvCxnSpPr>
+          <p:cNvPr id="7" name="Straight Connector 6">
+            <a:extLst>
+              <a:ext uri="{FF2B5EF4-FFF2-40B4-BE49-F238E27FC236}">
+                <a16:creationId xmlns:a16="http://schemas.microsoft.com/office/drawing/2014/main" id="{F08AB292-230E-E7E4-2339-CF122F10795C}"/>
+              </a:ext>
+            </a:extLst>
+          </p:cNvPr>
+          <p:cNvCxnSpPr>
+            <a:cxnSpLocks/>
+            <a:stCxn id="34" idx="6"/>
+            <a:endCxn id="45" idx="0"/>
+          </p:cNvCxnSpPr>
+          <p:nvPr/>
+        </p:nvCxnSpPr>
+        <p:spPr>
+          <a:xfrm>
+            <a:off x="3839102" y="1731631"/>
+            <a:ext cx="1525749" cy="836163"/>
+          </a:xfrm>
+          <a:prstGeom prst="line">
+            <a:avLst/>
+          </a:prstGeom>
+        </p:spPr>
+        <p:style>
+          <a:lnRef idx="2">
+            <a:schemeClr val="dk1"/>
+          </a:lnRef>
+          <a:fillRef idx="0">
+            <a:schemeClr val="dk1"/>
+          </a:fillRef>
+          <a:effectRef idx="1">
+            <a:schemeClr val="dk1"/>
           </a:effectRef>
           <a:fontRef idx="minor">
             <a:schemeClr val="tx1"/>
@@ -9895,12 +9936,6 @@
 </file>
 
 <file path=customXml/item1.xml><?xml version="1.0" encoding="utf-8"?>
-<p:properties xmlns:p="http://schemas.microsoft.com/office/2006/metadata/properties" xmlns:xsi="http://www.w3.org/2001/XMLSchema-instance" xmlns:pc="http://schemas.microsoft.com/office/infopath/2007/PartnerControls">
-  <documentManagement/>
-</p:properties>
-</file>
-
-<file path=customXml/item2.xml><?xml version="1.0" encoding="utf-8"?>
 <ct:contentTypeSchema xmlns:ct="http://schemas.microsoft.com/office/2006/metadata/contentType" xmlns:ma="http://schemas.microsoft.com/office/2006/metadata/properties/metaAttributes" ct:_="" ma:_="" ma:contentTypeName="Document" ma:contentTypeID="0x010100C11066598DA2094897C17F025BEB5C33" ma:contentTypeVersion="11" ma:contentTypeDescription="Create a new document." ma:contentTypeScope="" ma:versionID="c132620416a636482ab79dc02cb4beda">
   <xsd:schema xmlns:xsd="http://www.w3.org/2001/XMLSchema" xmlns:xs="http://www.w3.org/2001/XMLSchema" xmlns:p="http://schemas.microsoft.com/office/2006/metadata/properties" xmlns:ns2="cc02a9f5-0e8f-478d-ae46-fce6cd025606" xmlns:ns3="5ed103a9-c213-4e89-b04a-978a9c9d0ecb" targetNamespace="http://schemas.microsoft.com/office/2006/metadata/properties" ma:root="true" ma:fieldsID="25d1ba42b03243f6fad1194b6d2737ac" ns2:_="" ns3:_="">
     <xsd:import namespace="cc02a9f5-0e8f-478d-ae46-fce6cd025606"/>
@@ -10109,6 +10144,12 @@
 </ct:contentTypeSchema>
 </file>
 
+<file path=customXml/item2.xml><?xml version="1.0" encoding="utf-8"?>
+<p:properties xmlns:p="http://schemas.microsoft.com/office/2006/metadata/properties" xmlns:xsi="http://www.w3.org/2001/XMLSchema-instance" xmlns:pc="http://schemas.microsoft.com/office/infopath/2007/PartnerControls">
+  <documentManagement/>
+</p:properties>
+</file>
+
 <file path=customXml/item3.xml><?xml version="1.0" encoding="utf-8"?>
 <?mso-contentType ?>
 <FormTemplates xmlns="http://schemas.microsoft.com/sharepoint/v3/contenttype/forms">
@@ -10119,23 +10160,6 @@
 </file>
 
 <file path=customXml/itemProps1.xml><?xml version="1.0" encoding="utf-8"?>
-<ds:datastoreItem xmlns:ds="http://schemas.openxmlformats.org/officeDocument/2006/customXml" ds:itemID="{10D81E0D-2C63-4EA5-9F60-BC113953F389}">
-  <ds:schemaRefs>
-    <ds:schemaRef ds:uri="http://www.w3.org/XML/1998/namespace"/>
-    <ds:schemaRef ds:uri="http://schemas.microsoft.com/office/infopath/2007/PartnerControls"/>
-    <ds:schemaRef ds:uri="http://schemas.microsoft.com/office/2006/documentManagement/types"/>
-    <ds:schemaRef ds:uri="http://purl.org/dc/dcmitype/"/>
-    <ds:schemaRef ds:uri="cc02a9f5-0e8f-478d-ae46-fce6cd025606"/>
-    <ds:schemaRef ds:uri="http://schemas.openxmlformats.org/package/2006/metadata/core-properties"/>
-    <ds:schemaRef ds:uri="http://schemas.microsoft.com/office/2006/metadata/properties"/>
-    <ds:schemaRef ds:uri="5ed103a9-c213-4e89-b04a-978a9c9d0ecb"/>
-    <ds:schemaRef ds:uri="http://purl.org/dc/terms/"/>
-    <ds:schemaRef ds:uri="http://purl.org/dc/elements/1.1/"/>
-  </ds:schemaRefs>
-</ds:datastoreItem>
-</file>
-
-<file path=customXml/itemProps2.xml><?xml version="1.0" encoding="utf-8"?>
 <ds:datastoreItem xmlns:ds="http://schemas.openxmlformats.org/officeDocument/2006/customXml" ds:itemID="{048D89ED-6A25-4B9D-BC75-65054FB7685E}">
   <ds:schemaRefs>
     <ds:schemaRef ds:uri="http://schemas.microsoft.com/office/2006/metadata/contentType"/>
@@ -10154,6 +10178,23 @@
 </ds:datastoreItem>
 </file>
 
+<file path=customXml/itemProps2.xml><?xml version="1.0" encoding="utf-8"?>
+<ds:datastoreItem xmlns:ds="http://schemas.openxmlformats.org/officeDocument/2006/customXml" ds:itemID="{10D81E0D-2C63-4EA5-9F60-BC113953F389}">
+  <ds:schemaRefs>
+    <ds:schemaRef ds:uri="http://www.w3.org/XML/1998/namespace"/>
+    <ds:schemaRef ds:uri="http://schemas.microsoft.com/office/infopath/2007/PartnerControls"/>
+    <ds:schemaRef ds:uri="http://schemas.microsoft.com/office/2006/documentManagement/types"/>
+    <ds:schemaRef ds:uri="http://purl.org/dc/dcmitype/"/>
+    <ds:schemaRef ds:uri="cc02a9f5-0e8f-478d-ae46-fce6cd025606"/>
+    <ds:schemaRef ds:uri="http://schemas.openxmlformats.org/package/2006/metadata/core-properties"/>
+    <ds:schemaRef ds:uri="http://schemas.microsoft.com/office/2006/metadata/properties"/>
+    <ds:schemaRef ds:uri="5ed103a9-c213-4e89-b04a-978a9c9d0ecb"/>
+    <ds:schemaRef ds:uri="http://purl.org/dc/terms/"/>
+    <ds:schemaRef ds:uri="http://purl.org/dc/elements/1.1/"/>
+  </ds:schemaRefs>
+</ds:datastoreItem>
+</file>
+
 <file path=customXml/itemProps3.xml><?xml version="1.0" encoding="utf-8"?>
 <ds:datastoreItem xmlns:ds="http://schemas.openxmlformats.org/officeDocument/2006/customXml" ds:itemID="{478A104F-5518-4387-A41C-C91F45F51F72}">
   <ds:schemaRefs>

</xml_diff>